<commit_message>
adding login and signup functionality
</commit_message>
<xml_diff>
--- a/static/final.pptx
+++ b/static/final.pptx
@@ -27,6 +27,7 @@
     <p:sldId id="275" r:id="rId21"/>
     <p:sldId id="279" r:id="rId22"/>
     <p:sldId id="280" r:id="rId23"/>
+    <p:sldId id="281" r:id="rId24"/>
   </p:sldIdLst>
   <p:sldSz cx="9144000" cy="6858000" type="screen4x3"/>
   <p:notesSz cx="6858000" cy="9144000"/>
@@ -332,7 +333,7 @@
           <a:p>
             <a:fld id="{72676E32-749C-4B24-8D9E-5BEE12CE53C7}" type="datetimeFigureOut">
               <a:rPr lang="en-US" smtClean="0"/>
-              <a:t>7/15/2023</a:t>
+              <a:t>7/22/2023</a:t>
             </a:fld>
             <a:endParaRPr lang="en-US"/>
           </a:p>
@@ -683,7 +684,7 @@
           <a:p>
             <a:fld id="{72676E32-749C-4B24-8D9E-5BEE12CE53C7}" type="datetimeFigureOut">
               <a:rPr lang="en-US" smtClean="0"/>
-              <a:t>7/15/2023</a:t>
+              <a:t>7/22/2023</a:t>
             </a:fld>
             <a:endParaRPr lang="en-US"/>
           </a:p>
@@ -857,7 +858,7 @@
           <a:p>
             <a:fld id="{72676E32-749C-4B24-8D9E-5BEE12CE53C7}" type="datetimeFigureOut">
               <a:rPr lang="en-US" smtClean="0"/>
-              <a:t>7/15/2023</a:t>
+              <a:t>7/22/2023</a:t>
             </a:fld>
             <a:endParaRPr lang="en-US"/>
           </a:p>
@@ -969,7 +970,7 @@
           <a:p>
             <a:fld id="{72676E32-749C-4B24-8D9E-5BEE12CE53C7}" type="datetimeFigureOut">
               <a:rPr lang="en-US" smtClean="0"/>
-              <a:t>7/15/2023</a:t>
+              <a:t>7/22/2023</a:t>
             </a:fld>
             <a:endParaRPr lang="en-US"/>
           </a:p>
@@ -1321,7 +1322,7 @@
           <a:p>
             <a:fld id="{72676E32-749C-4B24-8D9E-5BEE12CE53C7}" type="datetimeFigureOut">
               <a:rPr lang="en-US" smtClean="0"/>
-              <a:t>7/15/2023</a:t>
+              <a:t>7/22/2023</a:t>
             </a:fld>
             <a:endParaRPr lang="en-US"/>
           </a:p>
@@ -1585,7 +1586,7 @@
           <a:p>
             <a:fld id="{72676E32-749C-4B24-8D9E-5BEE12CE53C7}" type="datetimeFigureOut">
               <a:rPr lang="en-US" smtClean="0"/>
-              <a:t>7/15/2023</a:t>
+              <a:t>7/22/2023</a:t>
             </a:fld>
             <a:endParaRPr lang="en-US"/>
           </a:p>
@@ -1946,7 +1947,7 @@
           <a:p>
             <a:fld id="{72676E32-749C-4B24-8D9E-5BEE12CE53C7}" type="datetimeFigureOut">
               <a:rPr lang="en-US" smtClean="0"/>
-              <a:t>7/15/2023</a:t>
+              <a:t>7/22/2023</a:t>
             </a:fld>
             <a:endParaRPr lang="en-US"/>
           </a:p>
@@ -2172,7 +2173,7 @@
           <a:p>
             <a:fld id="{72676E32-749C-4B24-8D9E-5BEE12CE53C7}" type="datetimeFigureOut">
               <a:rPr lang="en-US" smtClean="0"/>
-              <a:t>7/15/2023</a:t>
+              <a:t>7/22/2023</a:t>
             </a:fld>
             <a:endParaRPr lang="en-US"/>
           </a:p>
@@ -2262,7 +2263,7 @@
           <a:p>
             <a:fld id="{72676E32-749C-4B24-8D9E-5BEE12CE53C7}" type="datetimeFigureOut">
               <a:rPr lang="en-US" smtClean="0"/>
-              <a:t>7/15/2023</a:t>
+              <a:t>7/22/2023</a:t>
             </a:fld>
             <a:endParaRPr lang="en-US"/>
           </a:p>
@@ -2528,7 +2529,7 @@
           <a:p>
             <a:fld id="{72676E32-749C-4B24-8D9E-5BEE12CE53C7}" type="datetimeFigureOut">
               <a:rPr lang="en-US" smtClean="0"/>
-              <a:t>7/15/2023</a:t>
+              <a:t>7/22/2023</a:t>
             </a:fld>
             <a:endParaRPr lang="en-US"/>
           </a:p>
@@ -2755,7 +2756,7 @@
           <a:p>
             <a:fld id="{72676E32-749C-4B24-8D9E-5BEE12CE53C7}" type="datetimeFigureOut">
               <a:rPr lang="en-US" smtClean="0"/>
-              <a:t>7/15/2023</a:t>
+              <a:t>7/22/2023</a:t>
             </a:fld>
             <a:endParaRPr lang="en-US"/>
           </a:p>
@@ -3257,7 +3258,7 @@
           <a:p>
             <a:fld id="{72676E32-749C-4B24-8D9E-5BEE12CE53C7}" type="datetimeFigureOut">
               <a:rPr lang="en-US" smtClean="0"/>
-              <a:t>7/15/2023</a:t>
+              <a:t>7/22/2023</a:t>
             </a:fld>
             <a:endParaRPr lang="en-US"/>
           </a:p>
@@ -3735,6 +3736,29 @@
             </a:r>
           </a:p>
           <a:p>
+            <a:r>
+              <a:rPr lang="en-IN" b="1" dirty="0">
+                <a:highlight>
+                  <a:srgbClr val="00FFFF"/>
+                </a:highlight>
+              </a:rPr>
+              <a:t>4.</a:t>
+            </a:r>
+            <a:r>
+              <a:rPr lang="en-IN" b="1">
+                <a:highlight>
+                  <a:srgbClr val="00FFFF"/>
+                </a:highlight>
+              </a:rPr>
+              <a:t>Shaipali Maurya</a:t>
+            </a:r>
+            <a:endParaRPr lang="en-IN" b="1" dirty="0">
+              <a:highlight>
+                <a:srgbClr val="00FFFF"/>
+              </a:highlight>
+            </a:endParaRPr>
+          </a:p>
+          <a:p>
             <a:endParaRPr lang="en-IN" b="1" dirty="0"/>
           </a:p>
         </p:txBody>
@@ -5025,6 +5049,197 @@
     <p:extLst>
       <p:ext uri="{BB962C8B-B14F-4D97-AF65-F5344CB8AC3E}">
         <p14:creationId xmlns:p14="http://schemas.microsoft.com/office/powerpoint/2010/main" val="1892604974"/>
+      </p:ext>
+    </p:extLst>
+  </p:cSld>
+  <p:clrMapOvr>
+    <a:masterClrMapping/>
+  </p:clrMapOvr>
+</p:sld>
+</file>
+
+<file path=ppt/slides/slide23.xml><?xml version="1.0" encoding="utf-8"?>
+<p:sld xmlns:a="http://schemas.openxmlformats.org/drawingml/2006/main" xmlns:r="http://schemas.openxmlformats.org/officeDocument/2006/relationships" xmlns:p="http://schemas.openxmlformats.org/presentationml/2006/main">
+  <p:cSld>
+    <p:spTree>
+      <p:nvGrpSpPr>
+        <p:cNvPr id="1" name=""/>
+        <p:cNvGrpSpPr/>
+        <p:nvPr/>
+      </p:nvGrpSpPr>
+      <p:grpSpPr>
+        <a:xfrm>
+          <a:off x="0" y="0"/>
+          <a:ext cx="0" cy="0"/>
+          <a:chOff x="0" y="0"/>
+          <a:chExt cx="0" cy="0"/>
+        </a:xfrm>
+      </p:grpSpPr>
+      <p:sp>
+        <p:nvSpPr>
+          <p:cNvPr id="2" name="Title 1">
+            <a:extLst>
+              <a:ext uri="{FF2B5EF4-FFF2-40B4-BE49-F238E27FC236}">
+                <a16:creationId xmlns:a16="http://schemas.microsoft.com/office/drawing/2014/main" id="{072CFDDD-E087-4482-9DB5-8F41574BD36B}"/>
+              </a:ext>
+            </a:extLst>
+          </p:cNvPr>
+          <p:cNvSpPr>
+            <a:spLocks noGrp="1"/>
+          </p:cNvSpPr>
+          <p:nvPr>
+            <p:ph type="title"/>
+          </p:nvPr>
+        </p:nvSpPr>
+        <p:spPr>
+          <a:xfrm>
+            <a:off x="940676" y="120869"/>
+            <a:ext cx="7772400" cy="1143000"/>
+          </a:xfrm>
+        </p:spPr>
+        <p:txBody>
+          <a:bodyPr>
+            <a:normAutofit/>
+          </a:bodyPr>
+          <a:lstStyle/>
+          <a:p>
+            <a:pPr algn="ctr"/>
+            <a:r>
+              <a:rPr lang="en-IN" sz="6600" b="1" dirty="0">
+                <a:solidFill>
+                  <a:srgbClr val="00B050"/>
+                </a:solidFill>
+              </a:rPr>
+              <a:t>About </a:t>
+            </a:r>
+            <a:r>
+              <a:rPr lang="en-IN" sz="6600" b="1" dirty="0" err="1">
+                <a:solidFill>
+                  <a:srgbClr val="00B050"/>
+                </a:solidFill>
+              </a:rPr>
+              <a:t>Auther</a:t>
+            </a:r>
+            <a:endParaRPr lang="en-IN" sz="6600" b="1" dirty="0">
+              <a:solidFill>
+                <a:srgbClr val="00B050"/>
+              </a:solidFill>
+            </a:endParaRPr>
+          </a:p>
+        </p:txBody>
+      </p:sp>
+      <p:pic>
+        <p:nvPicPr>
+          <p:cNvPr id="5" name="Content Placeholder 4">
+            <a:extLst>
+              <a:ext uri="{FF2B5EF4-FFF2-40B4-BE49-F238E27FC236}">
+                <a16:creationId xmlns:a16="http://schemas.microsoft.com/office/drawing/2014/main" id="{450067BE-7247-4C83-8D76-21089BB3314F}"/>
+              </a:ext>
+            </a:extLst>
+          </p:cNvPr>
+          <p:cNvPicPr>
+            <a:picLocks noGrp="1" noChangeAspect="1"/>
+          </p:cNvPicPr>
+          <p:nvPr>
+            <p:ph sz="quarter" idx="1"/>
+          </p:nvPr>
+        </p:nvPicPr>
+        <p:blipFill>
+          <a:blip r:embed="rId2" cstate="print">
+            <a:extLst>
+              <a:ext uri="{28A0092B-C50C-407E-A947-70E740481C1C}">
+                <a14:useLocalDpi xmlns:a14="http://schemas.microsoft.com/office/drawing/2010/main" val="0"/>
+              </a:ext>
+            </a:extLst>
+          </a:blip>
+          <a:stretch>
+            <a:fillRect/>
+          </a:stretch>
+        </p:blipFill>
+        <p:spPr>
+          <a:xfrm>
+            <a:off x="2705100" y="1179374"/>
+            <a:ext cx="3733800" cy="3733800"/>
+          </a:xfrm>
+        </p:spPr>
+      </p:pic>
+      <p:sp>
+        <p:nvSpPr>
+          <p:cNvPr id="6" name="TextBox 5">
+            <a:extLst>
+              <a:ext uri="{FF2B5EF4-FFF2-40B4-BE49-F238E27FC236}">
+                <a16:creationId xmlns:a16="http://schemas.microsoft.com/office/drawing/2014/main" id="{D8B12B61-5349-4A2B-B865-DE2801B06B3A}"/>
+              </a:ext>
+            </a:extLst>
+          </p:cNvPr>
+          <p:cNvSpPr txBox="1"/>
+          <p:nvPr/>
+        </p:nvSpPr>
+        <p:spPr>
+          <a:xfrm>
+            <a:off x="914400" y="4969667"/>
+            <a:ext cx="7315200" cy="1754326"/>
+          </a:xfrm>
+          <a:prstGeom prst="rect">
+            <a:avLst/>
+          </a:prstGeom>
+          <a:noFill/>
+        </p:spPr>
+        <p:txBody>
+          <a:bodyPr wrap="square" rtlCol="0">
+            <a:spAutoFit/>
+          </a:bodyPr>
+          <a:lstStyle/>
+          <a:p>
+            <a:r>
+              <a:rPr lang="en-IN" b="1" dirty="0" err="1"/>
+              <a:t>Shaipali</a:t>
+            </a:r>
+            <a:r>
+              <a:rPr lang="en-IN" b="1" dirty="0"/>
+              <a:t> Maurya is Student of Second Semester student.</a:t>
+            </a:r>
+          </a:p>
+          <a:p>
+            <a:r>
+              <a:rPr lang="en-IN" b="1" dirty="0"/>
+              <a:t>She is a brilliant Programmer in Python and she have </a:t>
+            </a:r>
+            <a:r>
+              <a:rPr lang="en-IN" b="1" dirty="0" err="1"/>
+              <a:t>knowlwdge</a:t>
+            </a:r>
+            <a:r>
+              <a:rPr lang="en-IN" b="1" dirty="0"/>
+              <a:t> of C Programming </a:t>
+            </a:r>
+          </a:p>
+          <a:p>
+            <a:r>
+              <a:rPr lang="en-IN" b="1" dirty="0"/>
+              <a:t>and html, </a:t>
+            </a:r>
+            <a:r>
+              <a:rPr lang="en-IN" b="1" dirty="0" err="1"/>
+              <a:t>css</a:t>
+            </a:r>
+            <a:r>
+              <a:rPr lang="en-IN" b="1" dirty="0"/>
+              <a:t> etc .</a:t>
+            </a:r>
+          </a:p>
+          <a:p>
+            <a:r>
+              <a:rPr lang="en-IN" b="1" dirty="0"/>
+              <a:t>She is a good mathematician and write this ppt by her mathematical knowledge incorporation with her friends.  </a:t>
+            </a:r>
+          </a:p>
+        </p:txBody>
+      </p:sp>
+    </p:spTree>
+    <p:extLst>
+      <p:ext uri="{BB962C8B-B14F-4D97-AF65-F5344CB8AC3E}">
+        <p14:creationId xmlns:p14="http://schemas.microsoft.com/office/powerpoint/2010/main" val="1711564589"/>
       </p:ext>
     </p:extLst>
   </p:cSld>

</xml_diff>